<commit_message>
fix Future rolling + added uniform sampled softmax
</commit_message>
<xml_diff>
--- a/Progress/8 Project Progress.pptx
+++ b/Progress/8 Project Progress.pptx
@@ -1521,7 +1521,7 @@
   <pc:docChgLst>
     <pc:chgData name="Kyriacos Kyriacou" userId="6a303e1966778a2b" providerId="LiveId" clId="{1DA5406A-61C4-4F7C-8CFF-A3D0BFC45DEC}"/>
     <pc:docChg chg="undo redo custSel addSld delSld modSld sldOrd">
-      <pc:chgData name="Kyriacos Kyriacou" userId="6a303e1966778a2b" providerId="LiveId" clId="{1DA5406A-61C4-4F7C-8CFF-A3D0BFC45DEC}" dt="2023-07-11T08:52:56.640" v="2261" actId="14100"/>
+      <pc:chgData name="Kyriacos Kyriacou" userId="6a303e1966778a2b" providerId="LiveId" clId="{1DA5406A-61C4-4F7C-8CFF-A3D0BFC45DEC}" dt="2023-07-11T09:55:22.268" v="2275" actId="20577"/>
       <pc:docMkLst>
         <pc:docMk/>
       </pc:docMkLst>
@@ -1541,13 +1541,13 @@
         </pc:spChg>
       </pc:sldChg>
       <pc:sldChg chg="modSp mod">
-        <pc:chgData name="Kyriacos Kyriacou" userId="6a303e1966778a2b" providerId="LiveId" clId="{1DA5406A-61C4-4F7C-8CFF-A3D0BFC45DEC}" dt="2023-07-10T18:04:19.004" v="2090" actId="20577"/>
+        <pc:chgData name="Kyriacos Kyriacou" userId="6a303e1966778a2b" providerId="LiveId" clId="{1DA5406A-61C4-4F7C-8CFF-A3D0BFC45DEC}" dt="2023-07-11T09:55:22.268" v="2275" actId="20577"/>
         <pc:sldMkLst>
           <pc:docMk/>
           <pc:sldMk cId="3264051298" sldId="264"/>
         </pc:sldMkLst>
         <pc:spChg chg="mod">
-          <ac:chgData name="Kyriacos Kyriacou" userId="6a303e1966778a2b" providerId="LiveId" clId="{1DA5406A-61C4-4F7C-8CFF-A3D0BFC45DEC}" dt="2023-07-10T18:04:19.004" v="2090" actId="20577"/>
+          <ac:chgData name="Kyriacos Kyriacou" userId="6a303e1966778a2b" providerId="LiveId" clId="{1DA5406A-61C4-4F7C-8CFF-A3D0BFC45DEC}" dt="2023-07-11T09:55:22.268" v="2275" actId="20577"/>
           <ac:spMkLst>
             <pc:docMk/>
             <pc:sldMk cId="3264051298" sldId="264"/>
@@ -1600,13 +1600,13 @@
         </pc:sldMkLst>
       </pc:sldChg>
       <pc:sldChg chg="modSp add mod ord">
-        <pc:chgData name="Kyriacos Kyriacou" userId="6a303e1966778a2b" providerId="LiveId" clId="{1DA5406A-61C4-4F7C-8CFF-A3D0BFC45DEC}" dt="2023-07-10T18:10:33.454" v="2242"/>
+        <pc:chgData name="Kyriacos Kyriacou" userId="6a303e1966778a2b" providerId="LiveId" clId="{1DA5406A-61C4-4F7C-8CFF-A3D0BFC45DEC}" dt="2023-07-11T09:50:43.883" v="2263" actId="207"/>
         <pc:sldMkLst>
           <pc:docMk/>
           <pc:sldMk cId="2709262603" sldId="275"/>
         </pc:sldMkLst>
         <pc:spChg chg="mod">
-          <ac:chgData name="Kyriacos Kyriacou" userId="6a303e1966778a2b" providerId="LiveId" clId="{1DA5406A-61C4-4F7C-8CFF-A3D0BFC45DEC}" dt="2023-07-10T18:10:33.454" v="2242"/>
+          <ac:chgData name="Kyriacos Kyriacou" userId="6a303e1966778a2b" providerId="LiveId" clId="{1DA5406A-61C4-4F7C-8CFF-A3D0BFC45DEC}" dt="2023-07-11T09:50:43.883" v="2263" actId="207"/>
           <ac:spMkLst>
             <pc:docMk/>
             <pc:sldMk cId="2709262603" sldId="275"/>
@@ -5442,10 +5442,7 @@
             <a:r>
               <a:rPr lang="en-GB" sz="1600" dirty="0">
                 <a:solidFill>
-                  <a:schemeClr val="tx2">
-                    <a:lumMod val="60000"/>
-                    <a:lumOff val="40000"/>
-                  </a:schemeClr>
+                  <a:srgbClr val="00B050"/>
                 </a:solidFill>
                 <a:latin typeface="Söhne"/>
                 <a:sym typeface="Wingdings" panose="05000000000000000000" pitchFamily="2" charset="2"/>
@@ -5485,10 +5482,7 @@
             <a:r>
               <a:rPr lang="en-GB" sz="1600" dirty="0">
                 <a:solidFill>
-                  <a:schemeClr val="tx2">
-                    <a:lumMod val="60000"/>
-                    <a:lumOff val="40000"/>
-                  </a:schemeClr>
+                  <a:srgbClr val="00B050"/>
                 </a:solidFill>
                 <a:latin typeface="Söhne"/>
                 <a:sym typeface="Wingdings" panose="05000000000000000000" pitchFamily="2" charset="2"/>
@@ -14518,6 +14512,21 @@
                 <a:sym typeface="Wingdings" panose="05000000000000000000" pitchFamily="2" charset="2"/>
               </a:rPr>
               <a:t> Next item + All action</a:t>
+            </a:r>
+          </a:p>
+          <a:p>
+            <a:r>
+              <a:rPr lang="en-GB" sz="2000" dirty="0">
+                <a:latin typeface="Söhne"/>
+              </a:rPr>
+              <a:t>Combined model </a:t>
+            </a:r>
+            <a:r>
+              <a:rPr lang="en-GB" sz="2000" dirty="0">
+                <a:latin typeface="Söhne"/>
+                <a:sym typeface="Wingdings" panose="05000000000000000000" pitchFamily="2" charset="2"/>
+              </a:rPr>
+              <a:t> Next item + Dense all action</a:t>
             </a:r>
           </a:p>
           <a:p>

</xml_diff>